<commit_message>
changed AND symbol in math formulas
</commit_message>
<xml_diff>
--- a/Presentation.pptx
+++ b/Presentation.pptx
@@ -219,7 +219,7 @@
           <a:p>
             <a:fld id="{8DC2A06E-71C4-43BA-ACEA-0EF960EE58DA}" type="datetimeFigureOut">
               <a:rPr lang="el-GR" smtClean="0"/>
-              <a:t>17/8/2023</a:t>
+              <a:t>25/9/2023</a:t>
             </a:fld>
             <a:endParaRPr lang="el-GR"/>
           </a:p>
@@ -1046,7 +1046,7 @@
           <a:p>
             <a:fld id="{B5E30DA5-A468-49AC-9645-F35AB9DAB0C5}" type="datetimeFigureOut">
               <a:rPr lang="el-GR" smtClean="0"/>
-              <a:t>17/8/2023</a:t>
+              <a:t>25/9/2023</a:t>
             </a:fld>
             <a:endParaRPr lang="el-GR"/>
           </a:p>
@@ -1396,7 +1396,7 @@
           <a:p>
             <a:fld id="{B5E30DA5-A468-49AC-9645-F35AB9DAB0C5}" type="datetimeFigureOut">
               <a:rPr lang="el-GR" smtClean="0"/>
-              <a:t>17/8/2023</a:t>
+              <a:t>25/9/2023</a:t>
             </a:fld>
             <a:endParaRPr lang="el-GR"/>
           </a:p>
@@ -1809,7 +1809,7 @@
           <a:p>
             <a:fld id="{B5E30DA5-A468-49AC-9645-F35AB9DAB0C5}" type="datetimeFigureOut">
               <a:rPr lang="el-GR" smtClean="0"/>
-              <a:t>17/8/2023</a:t>
+              <a:t>25/9/2023</a:t>
             </a:fld>
             <a:endParaRPr lang="el-GR"/>
           </a:p>
@@ -2157,7 +2157,7 @@
           <a:p>
             <a:fld id="{B5E30DA5-A468-49AC-9645-F35AB9DAB0C5}" type="datetimeFigureOut">
               <a:rPr lang="el-GR" smtClean="0"/>
-              <a:t>17/8/2023</a:t>
+              <a:t>25/9/2023</a:t>
             </a:fld>
             <a:endParaRPr lang="el-GR"/>
           </a:p>
@@ -2489,7 +2489,7 @@
           <a:p>
             <a:fld id="{B5E30DA5-A468-49AC-9645-F35AB9DAB0C5}" type="datetimeFigureOut">
               <a:rPr lang="el-GR" smtClean="0"/>
-              <a:t>17/8/2023</a:t>
+              <a:t>25/9/2023</a:t>
             </a:fld>
             <a:endParaRPr lang="el-GR"/>
           </a:p>
@@ -2897,7 +2897,7 @@
           <a:p>
             <a:fld id="{B5E30DA5-A468-49AC-9645-F35AB9DAB0C5}" type="datetimeFigureOut">
               <a:rPr lang="el-GR" smtClean="0"/>
-              <a:t>17/8/2023</a:t>
+              <a:t>25/9/2023</a:t>
             </a:fld>
             <a:endParaRPr lang="el-GR"/>
           </a:p>
@@ -3166,7 +3166,7 @@
           <a:p>
             <a:fld id="{B5E30DA5-A468-49AC-9645-F35AB9DAB0C5}" type="datetimeFigureOut">
               <a:rPr lang="el-GR" smtClean="0"/>
-              <a:t>17/8/2023</a:t>
+              <a:t>25/9/2023</a:t>
             </a:fld>
             <a:endParaRPr lang="el-GR"/>
           </a:p>
@@ -3440,7 +3440,7 @@
           <a:p>
             <a:fld id="{B5E30DA5-A468-49AC-9645-F35AB9DAB0C5}" type="datetimeFigureOut">
               <a:rPr lang="el-GR" smtClean="0"/>
-              <a:t>17/8/2023</a:t>
+              <a:t>25/9/2023</a:t>
             </a:fld>
             <a:endParaRPr lang="el-GR"/>
           </a:p>
@@ -3714,7 +3714,7 @@
           <a:p>
             <a:fld id="{B5E30DA5-A468-49AC-9645-F35AB9DAB0C5}" type="datetimeFigureOut">
               <a:rPr lang="el-GR" smtClean="0"/>
-              <a:t>17/8/2023</a:t>
+              <a:t>25/9/2023</a:t>
             </a:fld>
             <a:endParaRPr lang="el-GR"/>
           </a:p>
@@ -4055,7 +4055,7 @@
           <a:p>
             <a:fld id="{B5E30DA5-A468-49AC-9645-F35AB9DAB0C5}" type="datetimeFigureOut">
               <a:rPr lang="el-GR" smtClean="0"/>
-              <a:t>17/8/2023</a:t>
+              <a:t>25/9/2023</a:t>
             </a:fld>
             <a:endParaRPr lang="el-GR"/>
           </a:p>
@@ -4390,7 +4390,7 @@
           <a:p>
             <a:fld id="{B5E30DA5-A468-49AC-9645-F35AB9DAB0C5}" type="datetimeFigureOut">
               <a:rPr lang="el-GR" smtClean="0"/>
-              <a:t>17/8/2023</a:t>
+              <a:t>25/9/2023</a:t>
             </a:fld>
             <a:endParaRPr lang="el-GR"/>
           </a:p>
@@ -4859,7 +4859,7 @@
           <a:p>
             <a:fld id="{B5E30DA5-A468-49AC-9645-F35AB9DAB0C5}" type="datetimeFigureOut">
               <a:rPr lang="el-GR" smtClean="0"/>
-              <a:t>17/8/2023</a:t>
+              <a:t>25/9/2023</a:t>
             </a:fld>
             <a:endParaRPr lang="el-GR"/>
           </a:p>
@@ -5076,7 +5076,7 @@
           <a:p>
             <a:fld id="{B5E30DA5-A468-49AC-9645-F35AB9DAB0C5}" type="datetimeFigureOut">
               <a:rPr lang="el-GR" smtClean="0"/>
-              <a:t>17/8/2023</a:t>
+              <a:t>25/9/2023</a:t>
             </a:fld>
             <a:endParaRPr lang="el-GR"/>
           </a:p>
@@ -5265,7 +5265,7 @@
           <a:p>
             <a:fld id="{B5E30DA5-A468-49AC-9645-F35AB9DAB0C5}" type="datetimeFigureOut">
               <a:rPr lang="el-GR" smtClean="0"/>
-              <a:t>17/8/2023</a:t>
+              <a:t>25/9/2023</a:t>
             </a:fld>
             <a:endParaRPr lang="el-GR"/>
           </a:p>
@@ -5610,7 +5610,7 @@
           <a:p>
             <a:fld id="{B5E30DA5-A468-49AC-9645-F35AB9DAB0C5}" type="datetimeFigureOut">
               <a:rPr lang="el-GR" smtClean="0"/>
-              <a:t>17/8/2023</a:t>
+              <a:t>25/9/2023</a:t>
             </a:fld>
             <a:endParaRPr lang="el-GR"/>
           </a:p>
@@ -5967,7 +5967,7 @@
           <a:p>
             <a:fld id="{B5E30DA5-A468-49AC-9645-F35AB9DAB0C5}" type="datetimeFigureOut">
               <a:rPr lang="el-GR" smtClean="0"/>
-              <a:t>17/8/2023</a:t>
+              <a:t>25/9/2023</a:t>
             </a:fld>
             <a:endParaRPr lang="el-GR"/>
           </a:p>
@@ -8116,7 +8116,7 @@
           <a:p>
             <a:fld id="{B5E30DA5-A468-49AC-9645-F35AB9DAB0C5}" type="datetimeFigureOut">
               <a:rPr lang="el-GR" smtClean="0"/>
-              <a:t>17/8/2023</a:t>
+              <a:t>25/9/2023</a:t>
             </a:fld>
             <a:endParaRPr lang="el-GR"/>
           </a:p>
@@ -8886,12 +8886,12 @@
   </p:clrMapOvr>
   <mc:AlternateContent xmlns:mc="http://schemas.openxmlformats.org/markup-compatibility/2006" xmlns:p159="http://schemas.microsoft.com/office/powerpoint/2015/09/main">
     <mc:Choice Requires="p159">
-      <p:transition xmlns:p14="http://schemas.microsoft.com/office/powerpoint/2010/main" spd="slow" p14:dur="2000">
+      <p:transition spd="med">
         <p159:morph option="byObject"/>
       </p:transition>
     </mc:Choice>
     <mc:Fallback xmlns="">
-      <p:transition spd="slow">
+      <p:transition spd="med">
         <p:fade/>
       </p:transition>
     </mc:Fallback>
@@ -9093,6 +9093,13 @@
             <a:schemeClr val="lt1"/>
           </a:fontRef>
         </p:style>
+        <p:txBody>
+          <a:bodyPr/>
+          <a:lstStyle/>
+          <a:p>
+            <a:endParaRPr lang="el-GR"/>
+          </a:p>
+        </p:txBody>
       </p:sp>
       <p:sp>
         <p:nvSpPr>
@@ -9192,6 +9199,13 @@
             <a:noFill/>
           </a:ln>
         </p:spPr>
+        <p:txBody>
+          <a:bodyPr/>
+          <a:lstStyle/>
+          <a:p>
+            <a:endParaRPr lang="el-GR"/>
+          </a:p>
+        </p:txBody>
       </p:sp>
       <mc:AlternateContent xmlns:mc="http://schemas.openxmlformats.org/markup-compatibility/2006" xmlns:a14="http://schemas.microsoft.com/office/drawing/2010/main">
         <mc:Choice Requires="a14">
@@ -10399,14 +10413,13 @@
               </a:ext>
             </a:extLst>
           </a:blip>
-          <a:stretch>
-            <a:fillRect/>
-          </a:stretch>
+          <a:srcRect/>
+          <a:stretch/>
         </p:blipFill>
         <p:spPr>
           <a:xfrm>
-            <a:off x="2310581" y="5181602"/>
-            <a:ext cx="7747819" cy="924948"/>
+            <a:off x="2310581" y="5260428"/>
+            <a:ext cx="7747819" cy="855237"/>
           </a:xfrm>
           <a:prstGeom prst="rect">
             <a:avLst/>
@@ -10425,12 +10438,12 @@
   </p:clrMapOvr>
   <mc:AlternateContent xmlns:mc="http://schemas.openxmlformats.org/markup-compatibility/2006" xmlns:p159="http://schemas.microsoft.com/office/powerpoint/2015/09/main">
     <mc:Choice Requires="p159">
-      <p:transition xmlns:p14="http://schemas.microsoft.com/office/powerpoint/2010/main" spd="slow" p14:dur="2000">
+      <p:transition spd="med">
         <p159:morph option="byObject"/>
       </p:transition>
     </mc:Choice>
     <mc:Fallback xmlns="">
-      <p:transition spd="slow">
+      <p:transition spd="med">
         <p:fade/>
       </p:transition>
     </mc:Fallback>
@@ -10656,6 +10669,13 @@
             <a:schemeClr val="lt1"/>
           </a:fontRef>
         </p:style>
+        <p:txBody>
+          <a:bodyPr/>
+          <a:lstStyle/>
+          <a:p>
+            <a:endParaRPr lang="el-GR"/>
+          </a:p>
+        </p:txBody>
       </p:sp>
       <p:sp>
         <p:nvSpPr>
@@ -10755,6 +10775,13 @@
             <a:noFill/>
           </a:ln>
         </p:spPr>
+        <p:txBody>
+          <a:bodyPr/>
+          <a:lstStyle/>
+          <a:p>
+            <a:endParaRPr lang="el-GR"/>
+          </a:p>
+        </p:txBody>
       </p:sp>
       <p:sp>
         <p:nvSpPr>
@@ -11405,42 +11432,6 @@
           </a:p>
         </p:txBody>
       </p:sp>
-      <p:pic>
-        <p:nvPicPr>
-          <p:cNvPr id="11" name="Εικόνα 10">
-            <a:extLst>
-              <a:ext uri="{FF2B5EF4-FFF2-40B4-BE49-F238E27FC236}">
-                <a16:creationId xmlns:a16="http://schemas.microsoft.com/office/drawing/2014/main" id="{6F6021EA-E511-B538-A08C-1BF65081C8C7}"/>
-              </a:ext>
-            </a:extLst>
-          </p:cNvPr>
-          <p:cNvPicPr>
-            <a:picLocks noChangeAspect="1"/>
-          </p:cNvPicPr>
-          <p:nvPr/>
-        </p:nvPicPr>
-        <p:blipFill>
-          <a:blip r:embed="rId4">
-            <a:extLst>
-              <a:ext uri="{28A0092B-C50C-407E-A947-70E740481C1C}">
-                <a14:useLocalDpi xmlns:a14="http://schemas.microsoft.com/office/drawing/2010/main" val="0"/>
-              </a:ext>
-            </a:extLst>
-          </a:blip>
-          <a:stretch>
-            <a:fillRect/>
-          </a:stretch>
-        </p:blipFill>
-        <p:spPr>
-          <a:xfrm>
-            <a:off x="2301239" y="4265764"/>
-            <a:ext cx="7772400" cy="910175"/>
-          </a:xfrm>
-          <a:prstGeom prst="rect">
-            <a:avLst/>
-          </a:prstGeom>
-        </p:spPr>
-      </p:pic>
       <p:sp>
         <p:nvSpPr>
           <p:cNvPr id="12" name="Θέση περιεχομένου 2">
@@ -11746,21 +11737,50 @@
           <p:nvPr/>
         </p:nvPicPr>
         <p:blipFill>
-          <a:blip r:embed="rId5">
+          <a:blip r:embed="rId4">
             <a:extLst>
               <a:ext uri="{28A0092B-C50C-407E-A947-70E740481C1C}">
                 <a14:useLocalDpi xmlns:a14="http://schemas.microsoft.com/office/drawing/2010/main" val="0"/>
               </a:ext>
             </a:extLst>
           </a:blip>
+          <a:srcRect/>
+          <a:stretch/>
+        </p:blipFill>
+        <p:spPr>
+          <a:xfrm>
+            <a:off x="2300026" y="5965653"/>
+            <a:ext cx="7773613" cy="449950"/>
+          </a:xfrm>
+          <a:prstGeom prst="rect">
+            <a:avLst/>
+          </a:prstGeom>
+        </p:spPr>
+      </p:pic>
+      <p:pic>
+        <p:nvPicPr>
+          <p:cNvPr id="4" name="Εικόνα 3">
+            <a:extLst>
+              <a:ext uri="{FF2B5EF4-FFF2-40B4-BE49-F238E27FC236}">
+                <a16:creationId xmlns:a16="http://schemas.microsoft.com/office/drawing/2014/main" id="{FB53636C-4B2F-998E-0CFD-25B9776F7033}"/>
+              </a:ext>
+            </a:extLst>
+          </p:cNvPr>
+          <p:cNvPicPr>
+            <a:picLocks noChangeAspect="1"/>
+          </p:cNvPicPr>
+          <p:nvPr/>
+        </p:nvPicPr>
+        <p:blipFill>
+          <a:blip r:embed="rId5"/>
           <a:stretch>
             <a:fillRect/>
           </a:stretch>
         </p:blipFill>
         <p:spPr>
           <a:xfrm>
-            <a:off x="2300026" y="5946052"/>
-            <a:ext cx="7773613" cy="489153"/>
+            <a:off x="2300025" y="4265763"/>
+            <a:ext cx="7772400" cy="925669"/>
           </a:xfrm>
           <a:prstGeom prst="rect">
             <a:avLst/>
@@ -11779,12 +11799,12 @@
   </p:clrMapOvr>
   <mc:AlternateContent xmlns:mc="http://schemas.openxmlformats.org/markup-compatibility/2006" xmlns:p159="http://schemas.microsoft.com/office/powerpoint/2015/09/main">
     <mc:Choice Requires="p159">
-      <p:transition xmlns:p14="http://schemas.microsoft.com/office/powerpoint/2010/main" spd="slow" p14:dur="2000">
+      <p:transition spd="med">
         <p159:morph option="byObject"/>
       </p:transition>
     </mc:Choice>
     <mc:Fallback xmlns="">
-      <p:transition spd="slow">
+      <p:transition spd="med">
         <p:fade/>
       </p:transition>
     </mc:Fallback>
@@ -12010,6 +12030,13 @@
             <a:schemeClr val="lt1"/>
           </a:fontRef>
         </p:style>
+        <p:txBody>
+          <a:bodyPr/>
+          <a:lstStyle/>
+          <a:p>
+            <a:endParaRPr lang="el-GR"/>
+          </a:p>
+        </p:txBody>
       </p:sp>
       <p:sp>
         <p:nvSpPr>
@@ -12109,6 +12136,13 @@
             <a:noFill/>
           </a:ln>
         </p:spPr>
+        <p:txBody>
+          <a:bodyPr/>
+          <a:lstStyle/>
+          <a:p>
+            <a:endParaRPr lang="el-GR"/>
+          </a:p>
+        </p:txBody>
       </p:sp>
       <p:sp>
         <p:nvSpPr>
@@ -12913,14 +12947,13 @@
               </a:ext>
             </a:extLst>
           </a:blip>
-          <a:stretch>
-            <a:fillRect/>
-          </a:stretch>
+          <a:srcRect/>
+          <a:stretch/>
         </p:blipFill>
         <p:spPr>
           <a:xfrm>
-            <a:off x="2181359" y="5098322"/>
-            <a:ext cx="7828721" cy="814114"/>
+            <a:off x="2181359" y="5203973"/>
+            <a:ext cx="7828721" cy="823201"/>
           </a:xfrm>
           <a:prstGeom prst="rect">
             <a:avLst/>
@@ -13066,12 +13099,12 @@
   </p:clrMapOvr>
   <mc:AlternateContent xmlns:mc="http://schemas.openxmlformats.org/markup-compatibility/2006" xmlns:p159="http://schemas.microsoft.com/office/powerpoint/2015/09/main">
     <mc:Choice Requires="p159">
-      <p:transition xmlns:p14="http://schemas.microsoft.com/office/powerpoint/2010/main" spd="slow" p14:dur="2000">
+      <p:transition spd="med">
         <p159:morph option="byObject"/>
       </p:transition>
     </mc:Choice>
     <mc:Fallback xmlns="">
-      <p:transition spd="slow">
+      <p:transition spd="med">
         <p:fade/>
       </p:transition>
     </mc:Fallback>
@@ -13273,6 +13306,13 @@
             <a:schemeClr val="lt1"/>
           </a:fontRef>
         </p:style>
+        <p:txBody>
+          <a:bodyPr/>
+          <a:lstStyle/>
+          <a:p>
+            <a:endParaRPr lang="el-GR"/>
+          </a:p>
+        </p:txBody>
       </p:sp>
       <p:sp>
         <p:nvSpPr>
@@ -13372,6 +13412,13 @@
             <a:noFill/>
           </a:ln>
         </p:spPr>
+        <p:txBody>
+          <a:bodyPr/>
+          <a:lstStyle/>
+          <a:p>
+            <a:endParaRPr lang="el-GR"/>
+          </a:p>
+        </p:txBody>
       </p:sp>
       <p:sp>
         <p:nvSpPr>
@@ -13492,12 +13539,12 @@
   </p:clrMapOvr>
   <mc:AlternateContent xmlns:mc="http://schemas.openxmlformats.org/markup-compatibility/2006" xmlns:p159="http://schemas.microsoft.com/office/powerpoint/2015/09/main">
     <mc:Choice Requires="p159">
-      <p:transition xmlns:p14="http://schemas.microsoft.com/office/powerpoint/2010/main" spd="slow" p14:dur="2000">
+      <p:transition spd="med">
         <p159:morph option="byObject"/>
       </p:transition>
     </mc:Choice>
     <mc:Fallback xmlns="">
-      <p:transition spd="slow">
+      <p:transition spd="med">
         <p:fade/>
       </p:transition>
     </mc:Fallback>
@@ -13723,6 +13770,13 @@
             <a:schemeClr val="lt1"/>
           </a:fontRef>
         </p:style>
+        <p:txBody>
+          <a:bodyPr/>
+          <a:lstStyle/>
+          <a:p>
+            <a:endParaRPr lang="el-GR"/>
+          </a:p>
+        </p:txBody>
       </p:sp>
       <p:sp>
         <p:nvSpPr>
@@ -13822,6 +13876,13 @@
             <a:noFill/>
           </a:ln>
         </p:spPr>
+        <p:txBody>
+          <a:bodyPr/>
+          <a:lstStyle/>
+          <a:p>
+            <a:endParaRPr lang="el-GR"/>
+          </a:p>
+        </p:txBody>
       </p:sp>
       <p:sp>
         <p:nvSpPr>
@@ -14444,7 +14505,7 @@
               </a:buClr>
             </a:pPr>
             <a:r>
-              <a:rPr lang="el-GR" sz="2000" kern="100" dirty="0">
+              <a:rPr lang="el-GR" sz="2200" kern="100" dirty="0">
                 <a:solidFill>
                   <a:prstClr val="black">
                     <a:lumMod val="75000"/>
@@ -14455,7 +14516,7 @@
               <a:t>Ό</a:t>
             </a:r>
             <a:r>
-              <a:rPr lang="el-GR" sz="2000" kern="100" dirty="0">
+              <a:rPr lang="el-GR" sz="2200" kern="100" dirty="0">
                 <a:effectLst/>
                 <a:ea typeface="Calibri" panose="020F0502020204030204" pitchFamily="34" charset="0"/>
                 <a:cs typeface="Times New Roman" panose="02020603050405020304" pitchFamily="18" charset="0"/>
@@ -14463,13 +14524,13 @@
               <a:t>ταν υπάρχουν ομάδες που χρωστάνε αγώνες</a:t>
             </a:r>
             <a:r>
-              <a:rPr lang="en-US" sz="2000" kern="100" dirty="0">
+              <a:rPr lang="en-US" sz="2200" kern="100" dirty="0">
                 <a:ea typeface="Calibri" panose="020F0502020204030204" pitchFamily="34" charset="0"/>
                 <a:cs typeface="Times New Roman" panose="02020603050405020304" pitchFamily="18" charset="0"/>
               </a:rPr>
               <a:t>.</a:t>
             </a:r>
-            <a:endParaRPr kumimoji="0" lang="el-GR" sz="2000" b="0" i="0" u="none" strike="noStrike" kern="100" cap="none" spc="0" normalizeH="0" baseline="0" noProof="0" dirty="0">
+            <a:endParaRPr kumimoji="0" lang="el-GR" sz="2200" b="0" i="0" u="none" strike="noStrike" kern="100" cap="none" spc="0" normalizeH="0" baseline="0" noProof="0" dirty="0">
               <a:ln>
                 <a:noFill/>
               </a:ln>
@@ -14699,7 +14760,7 @@
       </p:sp>
       <p:pic>
         <p:nvPicPr>
-          <p:cNvPr id="3" name="Εικόνα 2" descr="Εικόνα που περιέχει κείμενο, γραμματοσειρά, λευκό, γραφικός χαρακτήρας&#10;&#10;Περιγραφή που δημιουργήθηκε αυτόματα">
+          <p:cNvPr id="3" name="Εικόνα 2">
             <a:extLst>
               <a:ext uri="{FF2B5EF4-FFF2-40B4-BE49-F238E27FC236}">
                 <a16:creationId xmlns:a16="http://schemas.microsoft.com/office/drawing/2014/main" id="{0DB34145-D46E-7181-AF71-7E5F5B05AD9D}"/>
@@ -14719,13 +14780,13 @@
               </a:ext>
             </a:extLst>
           </a:blip>
-          <a:srcRect l="-1" t="1" r="83" b="-7197"/>
+          <a:srcRect l="-26" r="-32"/>
           <a:stretch/>
         </p:blipFill>
         <p:spPr>
           <a:xfrm>
-            <a:off x="728260" y="2420764"/>
-            <a:ext cx="10734913" cy="1888574"/>
+            <a:off x="728259" y="2420764"/>
+            <a:ext cx="10734914" cy="1796129"/>
           </a:xfrm>
           <a:prstGeom prst="rect">
             <a:avLst/>
@@ -14734,7 +14795,7 @@
       </p:pic>
       <p:pic>
         <p:nvPicPr>
-          <p:cNvPr id="19" name="Εικόνα 18" descr="Εικόνα που περιέχει κείμενο, γραμματοσειρά, λευκό, γραμμή&#10;&#10;Περιγραφή που δημιουργήθηκε αυτόματα">
+          <p:cNvPr id="19" name="Εικόνα 18">
             <a:extLst>
               <a:ext uri="{FF2B5EF4-FFF2-40B4-BE49-F238E27FC236}">
                 <a16:creationId xmlns:a16="http://schemas.microsoft.com/office/drawing/2014/main" id="{017FE6C0-111F-B8EA-DA05-033792AFA56E}"/>
@@ -14754,14 +14815,13 @@
               </a:ext>
             </a:extLst>
           </a:blip>
-          <a:stretch>
-            <a:fillRect/>
-          </a:stretch>
+          <a:srcRect/>
+          <a:stretch/>
         </p:blipFill>
         <p:spPr>
           <a:xfrm>
-            <a:off x="728259" y="4874516"/>
-            <a:ext cx="10734913" cy="1699904"/>
+            <a:off x="728259" y="4888491"/>
+            <a:ext cx="10734913" cy="1787612"/>
           </a:xfrm>
           <a:prstGeom prst="rect">
             <a:avLst/>
@@ -14780,12 +14840,12 @@
   </p:clrMapOvr>
   <mc:AlternateContent xmlns:mc="http://schemas.openxmlformats.org/markup-compatibility/2006" xmlns:p159="http://schemas.microsoft.com/office/powerpoint/2015/09/main">
     <mc:Choice Requires="p159">
-      <p:transition xmlns:p14="http://schemas.microsoft.com/office/powerpoint/2010/main" spd="slow" p14:dur="2000">
+      <p:transition spd="med">
         <p159:morph option="byObject"/>
       </p:transition>
     </mc:Choice>
     <mc:Fallback xmlns="">
-      <p:transition spd="slow">
+      <p:transition spd="med">
         <p:fade/>
       </p:transition>
     </mc:Fallback>
@@ -14987,6 +15047,13 @@
             <a:schemeClr val="lt1"/>
           </a:fontRef>
         </p:style>
+        <p:txBody>
+          <a:bodyPr/>
+          <a:lstStyle/>
+          <a:p>
+            <a:endParaRPr lang="el-GR"/>
+          </a:p>
+        </p:txBody>
       </p:sp>
       <p:sp>
         <p:nvSpPr>
@@ -15086,6 +15153,13 @@
             <a:noFill/>
           </a:ln>
         </p:spPr>
+        <p:txBody>
+          <a:bodyPr/>
+          <a:lstStyle/>
+          <a:p>
+            <a:endParaRPr lang="el-GR"/>
+          </a:p>
+        </p:txBody>
       </p:sp>
       <p:sp>
         <p:nvSpPr>
@@ -15200,12 +15274,12 @@
   </p:clrMapOvr>
   <mc:AlternateContent xmlns:mc="http://schemas.openxmlformats.org/markup-compatibility/2006" xmlns:p159="http://schemas.microsoft.com/office/powerpoint/2015/09/main">
     <mc:Choice Requires="p159">
-      <p:transition xmlns:p14="http://schemas.microsoft.com/office/powerpoint/2010/main" spd="slow" p14:dur="2000">
+      <p:transition spd="med">
         <p159:morph option="byObject"/>
       </p:transition>
     </mc:Choice>
     <mc:Fallback xmlns="">
-      <p:transition spd="slow">
+      <p:transition spd="med">
         <p:fade/>
       </p:transition>
     </mc:Fallback>
@@ -15407,6 +15481,13 @@
             <a:schemeClr val="lt1"/>
           </a:fontRef>
         </p:style>
+        <p:txBody>
+          <a:bodyPr/>
+          <a:lstStyle/>
+          <a:p>
+            <a:endParaRPr lang="el-GR"/>
+          </a:p>
+        </p:txBody>
       </p:sp>
       <p:sp>
         <p:nvSpPr>
@@ -15506,6 +15587,13 @@
             <a:noFill/>
           </a:ln>
         </p:spPr>
+        <p:txBody>
+          <a:bodyPr/>
+          <a:lstStyle/>
+          <a:p>
+            <a:endParaRPr lang="el-GR"/>
+          </a:p>
+        </p:txBody>
       </p:sp>
       <p:pic>
         <p:nvPicPr>
@@ -15714,12 +15802,12 @@
   </p:clrMapOvr>
   <mc:AlternateContent xmlns:mc="http://schemas.openxmlformats.org/markup-compatibility/2006" xmlns:p159="http://schemas.microsoft.com/office/powerpoint/2015/09/main">
     <mc:Choice Requires="p159">
-      <p:transition xmlns:p14="http://schemas.microsoft.com/office/powerpoint/2010/main" spd="slow" p14:dur="2000">
+      <p:transition spd="med">
         <p159:morph option="byObject"/>
       </p:transition>
     </mc:Choice>
     <mc:Fallback xmlns="">
-      <p:transition spd="slow">
+      <p:transition spd="med">
         <p:fade/>
       </p:transition>
     </mc:Fallback>
@@ -15929,6 +16017,13 @@
             <a:schemeClr val="lt1"/>
           </a:fontRef>
         </p:style>
+        <p:txBody>
+          <a:bodyPr/>
+          <a:lstStyle/>
+          <a:p>
+            <a:endParaRPr lang="el-GR"/>
+          </a:p>
+        </p:txBody>
       </p:sp>
       <p:sp>
         <p:nvSpPr>
@@ -16028,6 +16123,13 @@
             <a:noFill/>
           </a:ln>
         </p:spPr>
+        <p:txBody>
+          <a:bodyPr/>
+          <a:lstStyle/>
+          <a:p>
+            <a:endParaRPr lang="el-GR"/>
+          </a:p>
+        </p:txBody>
       </p:sp>
       <p:sp>
         <p:nvSpPr>
@@ -16830,12 +16932,12 @@
   </p:clrMapOvr>
   <mc:AlternateContent xmlns:mc="http://schemas.openxmlformats.org/markup-compatibility/2006" xmlns:p159="http://schemas.microsoft.com/office/powerpoint/2015/09/main">
     <mc:Choice Requires="p159">
-      <p:transition xmlns:p14="http://schemas.microsoft.com/office/powerpoint/2010/main" spd="slow" p14:dur="2000">
+      <p:transition spd="med">
         <p159:morph option="byObject"/>
       </p:transition>
     </mc:Choice>
     <mc:Fallback xmlns="">
-      <p:transition spd="slow">
+      <p:transition spd="med">
         <p:fade/>
       </p:transition>
     </mc:Fallback>
@@ -17037,6 +17139,13 @@
             <a:schemeClr val="lt1"/>
           </a:fontRef>
         </p:style>
+        <p:txBody>
+          <a:bodyPr/>
+          <a:lstStyle/>
+          <a:p>
+            <a:endParaRPr lang="el-GR"/>
+          </a:p>
+        </p:txBody>
       </p:sp>
       <p:sp>
         <p:nvSpPr>
@@ -17136,6 +17245,13 @@
             <a:noFill/>
           </a:ln>
         </p:spPr>
+        <p:txBody>
+          <a:bodyPr/>
+          <a:lstStyle/>
+          <a:p>
+            <a:endParaRPr lang="el-GR"/>
+          </a:p>
+        </p:txBody>
       </p:sp>
       <p:sp>
         <p:nvSpPr>
@@ -17277,12 +17393,12 @@
   </p:clrMapOvr>
   <mc:AlternateContent xmlns:mc="http://schemas.openxmlformats.org/markup-compatibility/2006" xmlns:p159="http://schemas.microsoft.com/office/powerpoint/2015/09/main">
     <mc:Choice Requires="p159">
-      <p:transition xmlns:p14="http://schemas.microsoft.com/office/powerpoint/2010/main" spd="slow" p14:dur="2000">
+      <p:transition spd="med">
         <p159:morph option="byObject"/>
       </p:transition>
     </mc:Choice>
     <mc:Fallback xmlns="">
-      <p:transition spd="slow">
+      <p:transition spd="med">
         <p:fade/>
       </p:transition>
     </mc:Fallback>
@@ -17484,6 +17600,13 @@
             <a:schemeClr val="lt1"/>
           </a:fontRef>
         </p:style>
+        <p:txBody>
+          <a:bodyPr/>
+          <a:lstStyle/>
+          <a:p>
+            <a:endParaRPr lang="el-GR"/>
+          </a:p>
+        </p:txBody>
       </p:sp>
       <p:sp>
         <p:nvSpPr>
@@ -17583,6 +17706,13 @@
             <a:noFill/>
           </a:ln>
         </p:spPr>
+        <p:txBody>
+          <a:bodyPr/>
+          <a:lstStyle/>
+          <a:p>
+            <a:endParaRPr lang="el-GR"/>
+          </a:p>
+        </p:txBody>
       </p:sp>
       <p:pic>
         <p:nvPicPr>
@@ -17738,12 +17868,12 @@
   </p:clrMapOvr>
   <mc:AlternateContent xmlns:mc="http://schemas.openxmlformats.org/markup-compatibility/2006" xmlns:p159="http://schemas.microsoft.com/office/powerpoint/2015/09/main">
     <mc:Choice Requires="p159">
-      <p:transition xmlns:p14="http://schemas.microsoft.com/office/powerpoint/2010/main" spd="slow" p14:dur="2000">
+      <p:transition spd="med">
         <p159:morph option="byObject"/>
       </p:transition>
     </mc:Choice>
     <mc:Fallback xmlns="">
-      <p:transition spd="slow">
+      <p:transition spd="med">
         <p:fade/>
       </p:transition>
     </mc:Fallback>
@@ -17958,6 +18088,13 @@
             <a:schemeClr val="lt1"/>
           </a:fontRef>
         </p:style>
+        <p:txBody>
+          <a:bodyPr/>
+          <a:lstStyle/>
+          <a:p>
+            <a:endParaRPr lang="el-GR"/>
+          </a:p>
+        </p:txBody>
       </p:sp>
       <p:sp>
         <p:nvSpPr>
@@ -18057,6 +18194,13 @@
             <a:noFill/>
           </a:ln>
         </p:spPr>
+        <p:txBody>
+          <a:bodyPr/>
+          <a:lstStyle/>
+          <a:p>
+            <a:endParaRPr lang="el-GR"/>
+          </a:p>
+        </p:txBody>
       </p:sp>
       <p:sp>
         <p:nvSpPr>
@@ -18113,15 +18257,6 @@
             </a:pPr>
             <a:r>
               <a:rPr lang="el-GR" sz="2000" dirty="0"/>
-              <a:t>Οργάνωση σε εθελοντική βάση</a:t>
-            </a:r>
-          </a:p>
-          <a:p>
-            <a:pPr>
-              <a:buClrTx/>
-            </a:pPr>
-            <a:r>
-              <a:rPr lang="el-GR" sz="2000" dirty="0"/>
               <a:t>Φοιτητικά πρωταθλήματα, τουρνουά σύντομης διάρκειας, τοπικά πρωταθλήματα</a:t>
             </a:r>
           </a:p>
@@ -18139,12 +18274,12 @@
   </p:clrMapOvr>
   <mc:AlternateContent xmlns:mc="http://schemas.openxmlformats.org/markup-compatibility/2006" xmlns:p159="http://schemas.microsoft.com/office/powerpoint/2015/09/main">
     <mc:Choice Requires="p159">
-      <p:transition xmlns:p14="http://schemas.microsoft.com/office/powerpoint/2010/main" spd="slow" p14:dur="2000">
+      <p:transition spd="med">
         <p159:morph option="byObject"/>
       </p:transition>
     </mc:Choice>
     <mc:Fallback xmlns="">
-      <p:transition spd="slow">
+      <p:transition spd="med">
         <p:fade/>
       </p:transition>
     </mc:Fallback>
@@ -18346,6 +18481,13 @@
             <a:schemeClr val="lt1"/>
           </a:fontRef>
         </p:style>
+        <p:txBody>
+          <a:bodyPr/>
+          <a:lstStyle/>
+          <a:p>
+            <a:endParaRPr lang="el-GR"/>
+          </a:p>
+        </p:txBody>
       </p:sp>
       <p:sp>
         <p:nvSpPr>
@@ -18445,6 +18587,13 @@
             <a:noFill/>
           </a:ln>
         </p:spPr>
+        <p:txBody>
+          <a:bodyPr/>
+          <a:lstStyle/>
+          <a:p>
+            <a:endParaRPr lang="el-GR"/>
+          </a:p>
+        </p:txBody>
       </p:sp>
       <p:sp>
         <p:nvSpPr>
@@ -18622,23 +18771,15 @@
             </a:pPr>
             <a:r>
               <a:rPr lang="el-GR" sz="1800" dirty="0"/>
-              <a:t>Μεγιστοποίηση </a:t>
+              <a:t>Μεγιστοποίηση προτιμήσεων </a:t>
             </a:r>
             <a:r>
-              <a:rPr lang="el-GR" sz="1800"/>
-              <a:t>προτιμήσεων </a:t>
-            </a:r>
-            <a:r>
-              <a:rPr lang="el-GR"/>
+              <a:rPr lang="el-GR" dirty="0"/>
               <a:t>παικτών</a:t>
             </a:r>
             <a:r>
-              <a:rPr lang="el-GR" sz="1800"/>
-              <a:t> </a:t>
-            </a:r>
-            <a:r>
               <a:rPr lang="el-GR" sz="1800" dirty="0"/>
-              <a:t>την ημέρα που αγωνίζονται</a:t>
+              <a:t> την ημέρα που αγωνίζονται</a:t>
             </a:r>
           </a:p>
         </p:txBody>
@@ -18665,14 +18806,13 @@
               </a:ext>
             </a:extLst>
           </a:blip>
-          <a:stretch>
-            <a:fillRect/>
-          </a:stretch>
+          <a:srcRect/>
+          <a:stretch/>
         </p:blipFill>
         <p:spPr>
           <a:xfrm>
-            <a:off x="1827329" y="2416571"/>
-            <a:ext cx="9006010" cy="1651225"/>
+            <a:off x="1970976" y="2416571"/>
+            <a:ext cx="8751492" cy="1651225"/>
           </a:xfrm>
           <a:prstGeom prst="rect">
             <a:avLst/>
@@ -18691,12 +18831,12 @@
   </p:clrMapOvr>
   <mc:AlternateContent xmlns:mc="http://schemas.openxmlformats.org/markup-compatibility/2006" xmlns:p159="http://schemas.microsoft.com/office/powerpoint/2015/09/main">
     <mc:Choice Requires="p159">
-      <p:transition xmlns:p14="http://schemas.microsoft.com/office/powerpoint/2010/main" spd="slow" p14:dur="2000">
+      <p:transition spd="med">
         <p159:morph option="byObject"/>
       </p:transition>
     </mc:Choice>
     <mc:Fallback xmlns="">
-      <p:transition spd="slow">
+      <p:transition spd="med">
         <p:fade/>
       </p:transition>
     </mc:Fallback>
@@ -18898,6 +19038,13 @@
             <a:schemeClr val="lt1"/>
           </a:fontRef>
         </p:style>
+        <p:txBody>
+          <a:bodyPr/>
+          <a:lstStyle/>
+          <a:p>
+            <a:endParaRPr lang="el-GR"/>
+          </a:p>
+        </p:txBody>
       </p:sp>
       <p:sp>
         <p:nvSpPr>
@@ -18997,6 +19144,13 @@
             <a:noFill/>
           </a:ln>
         </p:spPr>
+        <p:txBody>
+          <a:bodyPr/>
+          <a:lstStyle/>
+          <a:p>
+            <a:endParaRPr lang="el-GR"/>
+          </a:p>
+        </p:txBody>
       </p:sp>
       <p:sp>
         <p:nvSpPr>
@@ -19212,12 +19366,12 @@
   </p:clrMapOvr>
   <mc:AlternateContent xmlns:mc="http://schemas.openxmlformats.org/markup-compatibility/2006" xmlns:p159="http://schemas.microsoft.com/office/powerpoint/2015/09/main">
     <mc:Choice Requires="p159">
-      <p:transition xmlns:p14="http://schemas.microsoft.com/office/powerpoint/2010/main" spd="slow" p14:dur="2000">
+      <p:transition spd="med">
         <p159:morph option="byObject"/>
       </p:transition>
     </mc:Choice>
     <mc:Fallback xmlns="">
-      <p:transition spd="slow">
+      <p:transition spd="med">
         <p:fade/>
       </p:transition>
     </mc:Fallback>
@@ -19419,6 +19573,13 @@
             <a:schemeClr val="lt1"/>
           </a:fontRef>
         </p:style>
+        <p:txBody>
+          <a:bodyPr/>
+          <a:lstStyle/>
+          <a:p>
+            <a:endParaRPr lang="el-GR"/>
+          </a:p>
+        </p:txBody>
       </p:sp>
       <p:sp>
         <p:nvSpPr>
@@ -19518,6 +19679,13 @@
             <a:noFill/>
           </a:ln>
         </p:spPr>
+        <p:txBody>
+          <a:bodyPr/>
+          <a:lstStyle/>
+          <a:p>
+            <a:endParaRPr lang="el-GR"/>
+          </a:p>
+        </p:txBody>
       </p:sp>
       <p:sp>
         <p:nvSpPr>
@@ -19782,12 +19950,12 @@
   </p:clrMapOvr>
   <mc:AlternateContent xmlns:mc="http://schemas.openxmlformats.org/markup-compatibility/2006" xmlns:p159="http://schemas.microsoft.com/office/powerpoint/2015/09/main">
     <mc:Choice Requires="p159">
-      <p:transition xmlns:p14="http://schemas.microsoft.com/office/powerpoint/2010/main" spd="slow" p14:dur="2000">
+      <p:transition spd="med">
         <p159:morph option="byObject"/>
       </p:transition>
     </mc:Choice>
     <mc:Fallback xmlns="">
-      <p:transition spd="slow">
+      <p:transition spd="med">
         <p:fade/>
       </p:transition>
     </mc:Fallback>
@@ -20474,6 +20642,13 @@
               <a:noFill/>
             </a:ln>
           </p:spPr>
+          <p:txBody>
+            <a:bodyPr/>
+            <a:lstStyle/>
+            <a:p>
+              <a:endParaRPr lang="el-GR"/>
+            </a:p>
+          </p:txBody>
         </p:sp>
         <p:sp>
           <p:nvSpPr>
@@ -20551,6 +20726,13 @@
               <a:noFill/>
             </a:ln>
           </p:spPr>
+          <p:txBody>
+            <a:bodyPr/>
+            <a:lstStyle/>
+            <a:p>
+              <a:endParaRPr lang="el-GR"/>
+            </a:p>
+          </p:txBody>
         </p:sp>
         <p:sp>
           <p:nvSpPr>
@@ -20633,6 +20815,13 @@
               <a:noFill/>
             </a:ln>
           </p:spPr>
+          <p:txBody>
+            <a:bodyPr/>
+            <a:lstStyle/>
+            <a:p>
+              <a:endParaRPr lang="el-GR"/>
+            </a:p>
+          </p:txBody>
         </p:sp>
         <p:sp>
           <p:nvSpPr>
@@ -20695,6 +20884,13 @@
               <a:noFill/>
             </a:ln>
           </p:spPr>
+          <p:txBody>
+            <a:bodyPr/>
+            <a:lstStyle/>
+            <a:p>
+              <a:endParaRPr lang="el-GR"/>
+            </a:p>
+          </p:txBody>
         </p:sp>
         <p:sp>
           <p:nvSpPr>
@@ -20792,6 +20988,13 @@
               <a:noFill/>
             </a:ln>
           </p:spPr>
+          <p:txBody>
+            <a:bodyPr/>
+            <a:lstStyle/>
+            <a:p>
+              <a:endParaRPr lang="el-GR"/>
+            </a:p>
+          </p:txBody>
         </p:sp>
         <p:sp>
           <p:nvSpPr>
@@ -20884,6 +21087,13 @@
               <a:noFill/>
             </a:ln>
           </p:spPr>
+          <p:txBody>
+            <a:bodyPr/>
+            <a:lstStyle/>
+            <a:p>
+              <a:endParaRPr lang="el-GR"/>
+            </a:p>
+          </p:txBody>
         </p:sp>
         <p:sp>
           <p:nvSpPr>
@@ -20956,6 +21166,13 @@
               <a:noFill/>
             </a:ln>
           </p:spPr>
+          <p:txBody>
+            <a:bodyPr/>
+            <a:lstStyle/>
+            <a:p>
+              <a:endParaRPr lang="el-GR"/>
+            </a:p>
+          </p:txBody>
         </p:sp>
         <p:sp>
           <p:nvSpPr>
@@ -21048,6 +21265,13 @@
               <a:noFill/>
             </a:ln>
           </p:spPr>
+          <p:txBody>
+            <a:bodyPr/>
+            <a:lstStyle/>
+            <a:p>
+              <a:endParaRPr lang="el-GR"/>
+            </a:p>
+          </p:txBody>
         </p:sp>
         <p:sp>
           <p:nvSpPr>
@@ -21175,6 +21399,13 @@
               <a:noFill/>
             </a:ln>
           </p:spPr>
+          <p:txBody>
+            <a:bodyPr/>
+            <a:lstStyle/>
+            <a:p>
+              <a:endParaRPr lang="el-GR"/>
+            </a:p>
+          </p:txBody>
         </p:sp>
         <p:sp>
           <p:nvSpPr>
@@ -21237,6 +21468,13 @@
               <a:noFill/>
             </a:ln>
           </p:spPr>
+          <p:txBody>
+            <a:bodyPr/>
+            <a:lstStyle/>
+            <a:p>
+              <a:endParaRPr lang="el-GR"/>
+            </a:p>
+          </p:txBody>
         </p:sp>
         <p:sp>
           <p:nvSpPr>
@@ -21309,6 +21547,13 @@
               <a:noFill/>
             </a:ln>
           </p:spPr>
+          <p:txBody>
+            <a:bodyPr/>
+            <a:lstStyle/>
+            <a:p>
+              <a:endParaRPr lang="el-GR"/>
+            </a:p>
+          </p:txBody>
         </p:sp>
         <p:sp>
           <p:nvSpPr>
@@ -21391,6 +21636,13 @@
               <a:noFill/>
             </a:ln>
           </p:spPr>
+          <p:txBody>
+            <a:bodyPr/>
+            <a:lstStyle/>
+            <a:p>
+              <a:endParaRPr lang="el-GR"/>
+            </a:p>
+          </p:txBody>
         </p:sp>
       </p:grpSp>
       <p:grpSp>
@@ -21546,6 +21798,13 @@
               <a:noFill/>
             </a:ln>
           </p:spPr>
+          <p:txBody>
+            <a:bodyPr/>
+            <a:lstStyle/>
+            <a:p>
+              <a:endParaRPr lang="el-GR"/>
+            </a:p>
+          </p:txBody>
         </p:sp>
         <p:sp>
           <p:nvSpPr>
@@ -21628,6 +21887,13 @@
               <a:noFill/>
             </a:ln>
           </p:spPr>
+          <p:txBody>
+            <a:bodyPr/>
+            <a:lstStyle/>
+            <a:p>
+              <a:endParaRPr lang="el-GR"/>
+            </a:p>
+          </p:txBody>
         </p:sp>
         <p:sp>
           <p:nvSpPr>
@@ -21710,6 +21976,13 @@
               <a:noFill/>
             </a:ln>
           </p:spPr>
+          <p:txBody>
+            <a:bodyPr/>
+            <a:lstStyle/>
+            <a:p>
+              <a:endParaRPr lang="el-GR"/>
+            </a:p>
+          </p:txBody>
         </p:sp>
         <p:sp>
           <p:nvSpPr>
@@ -21807,6 +22080,13 @@
               <a:noFill/>
             </a:ln>
           </p:spPr>
+          <p:txBody>
+            <a:bodyPr/>
+            <a:lstStyle/>
+            <a:p>
+              <a:endParaRPr lang="el-GR"/>
+            </a:p>
+          </p:txBody>
         </p:sp>
         <p:sp>
           <p:nvSpPr>
@@ -21914,6 +22194,13 @@
               <a:noFill/>
             </a:ln>
           </p:spPr>
+          <p:txBody>
+            <a:bodyPr/>
+            <a:lstStyle/>
+            <a:p>
+              <a:endParaRPr lang="el-GR"/>
+            </a:p>
+          </p:txBody>
         </p:sp>
         <p:sp>
           <p:nvSpPr>
@@ -21976,6 +22263,13 @@
               <a:noFill/>
             </a:ln>
           </p:spPr>
+          <p:txBody>
+            <a:bodyPr/>
+            <a:lstStyle/>
+            <a:p>
+              <a:endParaRPr lang="el-GR"/>
+            </a:p>
+          </p:txBody>
         </p:sp>
         <p:sp>
           <p:nvSpPr>
@@ -22053,6 +22347,13 @@
               <a:noFill/>
             </a:ln>
           </p:spPr>
+          <p:txBody>
+            <a:bodyPr/>
+            <a:lstStyle/>
+            <a:p>
+              <a:endParaRPr lang="el-GR"/>
+            </a:p>
+          </p:txBody>
         </p:sp>
         <p:sp>
           <p:nvSpPr>
@@ -22175,6 +22476,13 @@
               <a:noFill/>
             </a:ln>
           </p:spPr>
+          <p:txBody>
+            <a:bodyPr/>
+            <a:lstStyle/>
+            <a:p>
+              <a:endParaRPr lang="el-GR"/>
+            </a:p>
+          </p:txBody>
         </p:sp>
         <p:sp>
           <p:nvSpPr>
@@ -22237,6 +22545,13 @@
               <a:noFill/>
             </a:ln>
           </p:spPr>
+          <p:txBody>
+            <a:bodyPr/>
+            <a:lstStyle/>
+            <a:p>
+              <a:endParaRPr lang="el-GR"/>
+            </a:p>
+          </p:txBody>
         </p:sp>
         <p:sp>
           <p:nvSpPr>
@@ -22319,6 +22634,13 @@
               <a:noFill/>
             </a:ln>
           </p:spPr>
+          <p:txBody>
+            <a:bodyPr/>
+            <a:lstStyle/>
+            <a:p>
+              <a:endParaRPr lang="el-GR"/>
+            </a:p>
+          </p:txBody>
         </p:sp>
         <p:sp>
           <p:nvSpPr>
@@ -22396,6 +22718,13 @@
               <a:noFill/>
             </a:ln>
           </p:spPr>
+          <p:txBody>
+            <a:bodyPr/>
+            <a:lstStyle/>
+            <a:p>
+              <a:endParaRPr lang="el-GR"/>
+            </a:p>
+          </p:txBody>
         </p:sp>
         <p:sp>
           <p:nvSpPr>
@@ -22478,6 +22807,13 @@
               <a:noFill/>
             </a:ln>
           </p:spPr>
+          <p:txBody>
+            <a:bodyPr/>
+            <a:lstStyle/>
+            <a:p>
+              <a:endParaRPr lang="el-GR"/>
+            </a:p>
+          </p:txBody>
         </p:sp>
       </p:grpSp>
       <p:sp>
@@ -22671,6 +23007,13 @@
             <a:noFill/>
           </a:ln>
         </p:spPr>
+        <p:txBody>
+          <a:bodyPr/>
+          <a:lstStyle/>
+          <a:p>
+            <a:endParaRPr lang="el-GR"/>
+          </a:p>
+        </p:txBody>
       </p:sp>
     </p:spTree>
     <p:extLst>
@@ -22684,12 +23027,12 @@
   </p:clrMapOvr>
   <mc:AlternateContent xmlns:mc="http://schemas.openxmlformats.org/markup-compatibility/2006" xmlns:p159="http://schemas.microsoft.com/office/powerpoint/2015/09/main">
     <mc:Choice Requires="p159">
-      <p:transition xmlns:p14="http://schemas.microsoft.com/office/powerpoint/2010/main" spd="slow" p14:dur="2000">
+      <p:transition spd="med">
         <p159:morph option="byObject"/>
       </p:transition>
     </mc:Choice>
     <mc:Fallback xmlns="">
-      <p:transition spd="slow">
+      <p:transition spd="med">
         <p:fade/>
       </p:transition>
     </mc:Fallback>
@@ -22975,6 +23318,13 @@
             <a:schemeClr val="lt1"/>
           </a:fontRef>
         </p:style>
+        <p:txBody>
+          <a:bodyPr/>
+          <a:lstStyle/>
+          <a:p>
+            <a:endParaRPr lang="el-GR"/>
+          </a:p>
+        </p:txBody>
       </p:sp>
       <p:sp>
         <p:nvSpPr>
@@ -23074,6 +23424,13 @@
             <a:noFill/>
           </a:ln>
         </p:spPr>
+        <p:txBody>
+          <a:bodyPr/>
+          <a:lstStyle/>
+          <a:p>
+            <a:endParaRPr lang="el-GR"/>
+          </a:p>
+        </p:txBody>
       </p:sp>
       <p:graphicFrame>
         <p:nvGraphicFramePr>
@@ -23090,19 +23447,19 @@
           <p:nvPr>
             <p:extLst>
               <p:ext uri="{D42A27DB-BD31-4B8C-83A1-F6EECF244321}">
-                <p14:modId xmlns:p14="http://schemas.microsoft.com/office/powerpoint/2010/main" val="2577019722"/>
+                <p14:modId xmlns:p14="http://schemas.microsoft.com/office/powerpoint/2010/main" val="891789753"/>
               </p:ext>
             </p:extLst>
           </p:nvPr>
         </p:nvGraphicFramePr>
         <p:xfrm>
-          <a:off x="2489235" y="2123822"/>
+          <a:off x="2469570" y="1996003"/>
           <a:ext cx="8389188" cy="4472472"/>
         </p:xfrm>
         <a:graphic>
           <a:graphicData uri="http://schemas.openxmlformats.org/drawingml/2006/table">
             <a:tbl>
-              <a:tblPr firstRow="1" firstCol="1" bandRow="1">
+              <a:tblPr firstRow="1" bandRow="1">
                 <a:tableStyleId>{5C22544A-7EE6-4342-B048-85BDC9FD1C3A}</a:tableStyleId>
               </a:tblPr>
               <a:tblGrid>
@@ -23729,12 +24086,12 @@
   </p:clrMapOvr>
   <mc:AlternateContent xmlns:mc="http://schemas.openxmlformats.org/markup-compatibility/2006" xmlns:p159="http://schemas.microsoft.com/office/powerpoint/2015/09/main">
     <mc:Choice Requires="p159">
-      <p:transition xmlns:p14="http://schemas.microsoft.com/office/powerpoint/2010/main" spd="slow" p14:dur="2000">
+      <p:transition spd="med">
         <p159:morph option="byObject"/>
       </p:transition>
     </mc:Choice>
     <mc:Fallback xmlns="">
-      <p:transition spd="slow">
+      <p:transition spd="med">
         <p:fade/>
       </p:transition>
     </mc:Fallback>
@@ -23890,6 +24247,13 @@
               <a:noFill/>
             </a:ln>
           </p:spPr>
+          <p:txBody>
+            <a:bodyPr/>
+            <a:lstStyle/>
+            <a:p>
+              <a:endParaRPr lang="el-GR"/>
+            </a:p>
+          </p:txBody>
         </p:sp>
         <p:sp>
           <p:nvSpPr>
@@ -23971,6 +24335,13 @@
               <a:noFill/>
             </a:ln>
           </p:spPr>
+          <p:txBody>
+            <a:bodyPr/>
+            <a:lstStyle/>
+            <a:p>
+              <a:endParaRPr lang="el-GR"/>
+            </a:p>
+          </p:txBody>
         </p:sp>
         <p:sp>
           <p:nvSpPr>
@@ -24057,6 +24428,13 @@
               <a:noFill/>
             </a:ln>
           </p:spPr>
+          <p:txBody>
+            <a:bodyPr/>
+            <a:lstStyle/>
+            <a:p>
+              <a:endParaRPr lang="el-GR"/>
+            </a:p>
+          </p:txBody>
         </p:sp>
         <p:sp>
           <p:nvSpPr>
@@ -24123,6 +24501,13 @@
               <a:noFill/>
             </a:ln>
           </p:spPr>
+          <p:txBody>
+            <a:bodyPr/>
+            <a:lstStyle/>
+            <a:p>
+              <a:endParaRPr lang="el-GR"/>
+            </a:p>
+          </p:txBody>
         </p:sp>
         <p:sp>
           <p:nvSpPr>
@@ -24224,6 +24609,13 @@
               <a:noFill/>
             </a:ln>
           </p:spPr>
+          <p:txBody>
+            <a:bodyPr/>
+            <a:lstStyle/>
+            <a:p>
+              <a:endParaRPr lang="el-GR"/>
+            </a:p>
+          </p:txBody>
         </p:sp>
         <p:sp>
           <p:nvSpPr>
@@ -24320,6 +24712,13 @@
               <a:noFill/>
             </a:ln>
           </p:spPr>
+          <p:txBody>
+            <a:bodyPr/>
+            <a:lstStyle/>
+            <a:p>
+              <a:endParaRPr lang="el-GR"/>
+            </a:p>
+          </p:txBody>
         </p:sp>
         <p:sp>
           <p:nvSpPr>
@@ -24396,6 +24795,13 @@
               <a:noFill/>
             </a:ln>
           </p:spPr>
+          <p:txBody>
+            <a:bodyPr/>
+            <a:lstStyle/>
+            <a:p>
+              <a:endParaRPr lang="el-GR"/>
+            </a:p>
+          </p:txBody>
         </p:sp>
         <p:sp>
           <p:nvSpPr>
@@ -24492,6 +24898,13 @@
               <a:noFill/>
             </a:ln>
           </p:spPr>
+          <p:txBody>
+            <a:bodyPr/>
+            <a:lstStyle/>
+            <a:p>
+              <a:endParaRPr lang="el-GR"/>
+            </a:p>
+          </p:txBody>
         </p:sp>
         <p:sp>
           <p:nvSpPr>
@@ -24623,6 +25036,13 @@
               <a:noFill/>
             </a:ln>
           </p:spPr>
+          <p:txBody>
+            <a:bodyPr/>
+            <a:lstStyle/>
+            <a:p>
+              <a:endParaRPr lang="el-GR"/>
+            </a:p>
+          </p:txBody>
         </p:sp>
         <p:sp>
           <p:nvSpPr>
@@ -24689,6 +25109,13 @@
               <a:noFill/>
             </a:ln>
           </p:spPr>
+          <p:txBody>
+            <a:bodyPr/>
+            <a:lstStyle/>
+            <a:p>
+              <a:endParaRPr lang="el-GR"/>
+            </a:p>
+          </p:txBody>
         </p:sp>
         <p:sp>
           <p:nvSpPr>
@@ -24765,6 +25192,13 @@
               <a:noFill/>
             </a:ln>
           </p:spPr>
+          <p:txBody>
+            <a:bodyPr/>
+            <a:lstStyle/>
+            <a:p>
+              <a:endParaRPr lang="el-GR"/>
+            </a:p>
+          </p:txBody>
         </p:sp>
         <p:sp>
           <p:nvSpPr>
@@ -24851,6 +25285,13 @@
               <a:noFill/>
             </a:ln>
           </p:spPr>
+          <p:txBody>
+            <a:bodyPr/>
+            <a:lstStyle/>
+            <a:p>
+              <a:endParaRPr lang="el-GR"/>
+            </a:p>
+          </p:txBody>
         </p:sp>
       </p:grpSp>
       <p:grpSp>
@@ -25002,6 +25443,13 @@
               <a:noFill/>
             </a:ln>
           </p:spPr>
+          <p:txBody>
+            <a:bodyPr/>
+            <a:lstStyle/>
+            <a:p>
+              <a:endParaRPr lang="el-GR"/>
+            </a:p>
+          </p:txBody>
         </p:sp>
         <p:sp>
           <p:nvSpPr>
@@ -25086,6 +25534,13 @@
               <a:noFill/>
             </a:ln>
           </p:spPr>
+          <p:txBody>
+            <a:bodyPr/>
+            <a:lstStyle/>
+            <a:p>
+              <a:endParaRPr lang="el-GR"/>
+            </a:p>
+          </p:txBody>
         </p:sp>
         <p:sp>
           <p:nvSpPr>
@@ -25170,6 +25625,13 @@
               <a:noFill/>
             </a:ln>
           </p:spPr>
+          <p:txBody>
+            <a:bodyPr/>
+            <a:lstStyle/>
+            <a:p>
+              <a:endParaRPr lang="el-GR"/>
+            </a:p>
+          </p:txBody>
         </p:sp>
         <p:sp>
           <p:nvSpPr>
@@ -25269,6 +25731,13 @@
               <a:noFill/>
             </a:ln>
           </p:spPr>
+          <p:txBody>
+            <a:bodyPr/>
+            <a:lstStyle/>
+            <a:p>
+              <a:endParaRPr lang="el-GR"/>
+            </a:p>
+          </p:txBody>
         </p:sp>
         <p:sp>
           <p:nvSpPr>
@@ -25378,6 +25847,13 @@
               <a:noFill/>
             </a:ln>
           </p:spPr>
+          <p:txBody>
+            <a:bodyPr/>
+            <a:lstStyle/>
+            <a:p>
+              <a:endParaRPr lang="el-GR"/>
+            </a:p>
+          </p:txBody>
         </p:sp>
         <p:sp>
           <p:nvSpPr>
@@ -25442,6 +25918,13 @@
               <a:noFill/>
             </a:ln>
           </p:spPr>
+          <p:txBody>
+            <a:bodyPr/>
+            <a:lstStyle/>
+            <a:p>
+              <a:endParaRPr lang="el-GR"/>
+            </a:p>
+          </p:txBody>
         </p:sp>
         <p:sp>
           <p:nvSpPr>
@@ -25521,6 +26004,13 @@
               <a:noFill/>
             </a:ln>
           </p:spPr>
+          <p:txBody>
+            <a:bodyPr/>
+            <a:lstStyle/>
+            <a:p>
+              <a:endParaRPr lang="el-GR"/>
+            </a:p>
+          </p:txBody>
         </p:sp>
         <p:sp>
           <p:nvSpPr>
@@ -25645,6 +26135,13 @@
               <a:noFill/>
             </a:ln>
           </p:spPr>
+          <p:txBody>
+            <a:bodyPr/>
+            <a:lstStyle/>
+            <a:p>
+              <a:endParaRPr lang="el-GR"/>
+            </a:p>
+          </p:txBody>
         </p:sp>
         <p:sp>
           <p:nvSpPr>
@@ -25709,6 +26206,13 @@
               <a:noFill/>
             </a:ln>
           </p:spPr>
+          <p:txBody>
+            <a:bodyPr/>
+            <a:lstStyle/>
+            <a:p>
+              <a:endParaRPr lang="el-GR"/>
+            </a:p>
+          </p:txBody>
         </p:sp>
         <p:sp>
           <p:nvSpPr>
@@ -25793,6 +26297,13 @@
               <a:noFill/>
             </a:ln>
           </p:spPr>
+          <p:txBody>
+            <a:bodyPr/>
+            <a:lstStyle/>
+            <a:p>
+              <a:endParaRPr lang="el-GR"/>
+            </a:p>
+          </p:txBody>
         </p:sp>
         <p:sp>
           <p:nvSpPr>
@@ -25872,6 +26383,13 @@
               <a:noFill/>
             </a:ln>
           </p:spPr>
+          <p:txBody>
+            <a:bodyPr/>
+            <a:lstStyle/>
+            <a:p>
+              <a:endParaRPr lang="el-GR"/>
+            </a:p>
+          </p:txBody>
         </p:sp>
         <p:sp>
           <p:nvSpPr>
@@ -25956,6 +26474,13 @@
               <a:noFill/>
             </a:ln>
           </p:spPr>
+          <p:txBody>
+            <a:bodyPr/>
+            <a:lstStyle/>
+            <a:p>
+              <a:endParaRPr lang="el-GR"/>
+            </a:p>
+          </p:txBody>
         </p:sp>
       </p:grpSp>
       <p:sp>
@@ -26011,6 +26536,13 @@
             <a:schemeClr val="lt1"/>
           </a:fontRef>
         </p:style>
+        <p:txBody>
+          <a:bodyPr/>
+          <a:lstStyle/>
+          <a:p>
+            <a:endParaRPr lang="el-GR"/>
+          </a:p>
+        </p:txBody>
       </p:sp>
       <p:sp>
         <p:nvSpPr>
@@ -26110,6 +26642,13 @@
             <a:noFill/>
           </a:ln>
         </p:spPr>
+        <p:txBody>
+          <a:bodyPr/>
+          <a:lstStyle/>
+          <a:p>
+            <a:endParaRPr lang="el-GR"/>
+          </a:p>
+        </p:txBody>
       </p:sp>
       <p:sp useBgFill="1">
         <p:nvSpPr>
@@ -26482,6 +27021,13 @@
             <a:schemeClr val="lt1"/>
           </a:fontRef>
         </p:style>
+        <p:txBody>
+          <a:bodyPr/>
+          <a:lstStyle/>
+          <a:p>
+            <a:endParaRPr lang="el-GR"/>
+          </a:p>
+        </p:txBody>
       </p:sp>
       <p:sp>
         <p:nvSpPr>
@@ -26690,12 +27236,16 @@
   <p:clrMapOvr>
     <a:masterClrMapping/>
   </p:clrMapOvr>
-  <mc:AlternateContent xmlns:mc="http://schemas.openxmlformats.org/markup-compatibility/2006" xmlns:p14="http://schemas.microsoft.com/office/powerpoint/2010/main">
-    <mc:Choice Requires="p14">
-      <p:transition p14:dur="0"/>
+  <mc:AlternateContent xmlns:mc="http://schemas.openxmlformats.org/markup-compatibility/2006" xmlns:p159="http://schemas.microsoft.com/office/powerpoint/2015/09/main">
+    <mc:Choice Requires="p159">
+      <p:transition spd="med">
+        <p159:morph option="byObject"/>
+      </p:transition>
     </mc:Choice>
     <mc:Fallback xmlns="">
-      <p:transition/>
+      <p:transition spd="med">
+        <p:fade/>
+      </p:transition>
     </mc:Fallback>
   </mc:AlternateContent>
   <p:timing>
@@ -26738,7 +27288,11 @@
                                           </p:stCondLst>
                                         </p:cTn>
                                         <p:tgtEl>
-                                          <p:spTgt spid="2"/>
+                                          <p:spTgt spid="2">
+                                            <p:txEl>
+                                              <p:charRg st="4294967295" end="4294967295"/>
+                                            </p:txEl>
+                                          </p:spTgt>
                                         </p:tgtEl>
                                         <p:attrNameLst>
                                           <p:attrName>style.visibility</p:attrName>
@@ -26752,7 +27306,11 @@
                                       <p:cBhvr>
                                         <p:cTn id="7" dur="400"/>
                                         <p:tgtEl>
-                                          <p:spTgt spid="2"/>
+                                          <p:spTgt spid="2">
+                                            <p:txEl>
+                                              <p:charRg st="4294967295" end="4294967295"/>
+                                            </p:txEl>
+                                          </p:spTgt>
                                         </p:tgtEl>
                                       </p:cBhvr>
                                     </p:animEffect>
@@ -26787,7 +27345,7 @@
       </p:par>
     </p:tnLst>
     <p:bldLst>
-      <p:bldP spid="2" grpId="0" animBg="1"/>
+      <p:bldP spid="2" grpId="0" autoUpdateAnimBg="0"/>
     </p:bldLst>
   </p:timing>
 </p:sld>
@@ -26992,6 +27550,13 @@
             <a:schemeClr val="lt1"/>
           </a:fontRef>
         </p:style>
+        <p:txBody>
+          <a:bodyPr/>
+          <a:lstStyle/>
+          <a:p>
+            <a:endParaRPr lang="el-GR"/>
+          </a:p>
+        </p:txBody>
       </p:sp>
       <p:sp>
         <p:nvSpPr>
@@ -27091,6 +27656,13 @@
             <a:noFill/>
           </a:ln>
         </p:spPr>
+        <p:txBody>
+          <a:bodyPr/>
+          <a:lstStyle/>
+          <a:p>
+            <a:endParaRPr lang="el-GR"/>
+          </a:p>
+        </p:txBody>
       </p:sp>
       <p:sp>
         <p:nvSpPr>
@@ -27333,12 +27905,12 @@
   </p:clrMapOvr>
   <mc:AlternateContent xmlns:mc="http://schemas.openxmlformats.org/markup-compatibility/2006" xmlns:p159="http://schemas.microsoft.com/office/powerpoint/2015/09/main">
     <mc:Choice Requires="p159">
-      <p:transition xmlns:p14="http://schemas.microsoft.com/office/powerpoint/2010/main" spd="slow" p14:dur="2000">
+      <p:transition spd="med">
         <p159:morph option="byObject"/>
       </p:transition>
     </mc:Choice>
     <mc:Fallback xmlns="">
-      <p:transition spd="slow">
+      <p:transition spd="med">
         <p:fade/>
       </p:transition>
     </mc:Fallback>
@@ -27540,6 +28112,13 @@
             <a:schemeClr val="lt1"/>
           </a:fontRef>
         </p:style>
+        <p:txBody>
+          <a:bodyPr/>
+          <a:lstStyle/>
+          <a:p>
+            <a:endParaRPr lang="el-GR"/>
+          </a:p>
+        </p:txBody>
       </p:sp>
       <p:sp>
         <p:nvSpPr>
@@ -27639,6 +28218,13 @@
             <a:noFill/>
           </a:ln>
         </p:spPr>
+        <p:txBody>
+          <a:bodyPr/>
+          <a:lstStyle/>
+          <a:p>
+            <a:endParaRPr lang="el-GR"/>
+          </a:p>
+        </p:txBody>
       </p:sp>
       <p:sp>
         <p:nvSpPr>
@@ -27760,12 +28346,12 @@
   </p:clrMapOvr>
   <mc:AlternateContent xmlns:mc="http://schemas.openxmlformats.org/markup-compatibility/2006" xmlns:p159="http://schemas.microsoft.com/office/powerpoint/2015/09/main">
     <mc:Choice Requires="p159">
-      <p:transition xmlns:p14="http://schemas.microsoft.com/office/powerpoint/2010/main" spd="slow" p14:dur="2000">
+      <p:transition spd="med">
         <p159:morph option="byObject"/>
       </p:transition>
     </mc:Choice>
     <mc:Fallback xmlns="">
-      <p:transition spd="slow">
+      <p:transition spd="med">
         <p:fade/>
       </p:transition>
     </mc:Fallback>
@@ -27972,6 +28558,13 @@
             <a:schemeClr val="lt1"/>
           </a:fontRef>
         </p:style>
+        <p:txBody>
+          <a:bodyPr/>
+          <a:lstStyle/>
+          <a:p>
+            <a:endParaRPr lang="el-GR"/>
+          </a:p>
+        </p:txBody>
       </p:sp>
       <p:sp>
         <p:nvSpPr>
@@ -28071,6 +28664,13 @@
             <a:noFill/>
           </a:ln>
         </p:spPr>
+        <p:txBody>
+          <a:bodyPr/>
+          <a:lstStyle/>
+          <a:p>
+            <a:endParaRPr lang="el-GR"/>
+          </a:p>
+        </p:txBody>
       </p:sp>
       <p:sp>
         <p:nvSpPr>
@@ -28167,7 +28767,19 @@
             </a:pPr>
             <a:r>
               <a:rPr lang="el-GR" sz="2000" dirty="0"/>
-              <a:t>Ομάδα διαθέσιμη όταν &gt;=5 παίκτες διαθέσιμοι</a:t>
+              <a:t>Ομάδα διαθέσιμη όταν</a:t>
+            </a:r>
+            <a:r>
+              <a:rPr lang="en-US" sz="2000" dirty="0"/>
+              <a:t> </a:t>
+            </a:r>
+            <a:r>
+              <a:rPr lang="el-GR" sz="2000"/>
+              <a:t>≥ 5 </a:t>
+            </a:r>
+            <a:r>
+              <a:rPr lang="el-GR" sz="2000" dirty="0"/>
+              <a:t>παίκτες διαθέσιμοι</a:t>
             </a:r>
           </a:p>
         </p:txBody>
@@ -28641,12 +29253,12 @@
   </p:clrMapOvr>
   <mc:AlternateContent xmlns:mc="http://schemas.openxmlformats.org/markup-compatibility/2006" xmlns:p159="http://schemas.microsoft.com/office/powerpoint/2015/09/main">
     <mc:Choice Requires="p159">
-      <p:transition xmlns:p14="http://schemas.microsoft.com/office/powerpoint/2010/main" spd="slow" p14:dur="2000">
+      <p:transition spd="med">
         <p159:morph option="byObject"/>
       </p:transition>
     </mc:Choice>
     <mc:Fallback xmlns="">
-      <p:transition spd="slow">
+      <p:transition spd="med">
         <p:fade/>
       </p:transition>
     </mc:Fallback>
@@ -28970,6 +29582,13 @@
             <a:schemeClr val="lt1"/>
           </a:fontRef>
         </p:style>
+        <p:txBody>
+          <a:bodyPr/>
+          <a:lstStyle/>
+          <a:p>
+            <a:endParaRPr lang="el-GR"/>
+          </a:p>
+        </p:txBody>
       </p:sp>
       <p:sp>
         <p:nvSpPr>
@@ -29069,6 +29688,13 @@
             <a:noFill/>
           </a:ln>
         </p:spPr>
+        <p:txBody>
+          <a:bodyPr/>
+          <a:lstStyle/>
+          <a:p>
+            <a:endParaRPr lang="el-GR"/>
+          </a:p>
+        </p:txBody>
       </p:sp>
       <p:sp>
         <p:nvSpPr>
@@ -29465,12 +30091,12 @@
   </p:clrMapOvr>
   <mc:AlternateContent xmlns:mc="http://schemas.openxmlformats.org/markup-compatibility/2006" xmlns:p159="http://schemas.microsoft.com/office/powerpoint/2015/09/main">
     <mc:Choice Requires="p159">
-      <p:transition xmlns:p14="http://schemas.microsoft.com/office/powerpoint/2010/main" spd="slow" p14:dur="2000">
+      <p:transition spd="med">
         <p159:morph option="byObject"/>
       </p:transition>
     </mc:Choice>
     <mc:Fallback xmlns="">
-      <p:transition spd="slow">
+      <p:transition spd="med">
         <p:fade/>
       </p:transition>
     </mc:Fallback>
@@ -29793,6 +30419,13 @@
             <a:schemeClr val="lt1"/>
           </a:fontRef>
         </p:style>
+        <p:txBody>
+          <a:bodyPr/>
+          <a:lstStyle/>
+          <a:p>
+            <a:endParaRPr lang="el-GR"/>
+          </a:p>
+        </p:txBody>
       </p:sp>
       <p:sp>
         <p:nvSpPr>
@@ -29892,6 +30525,13 @@
             <a:noFill/>
           </a:ln>
         </p:spPr>
+        <p:txBody>
+          <a:bodyPr/>
+          <a:lstStyle/>
+          <a:p>
+            <a:endParaRPr lang="el-GR"/>
+          </a:p>
+        </p:txBody>
       </p:sp>
       <p:sp>
         <p:nvSpPr>
@@ -30382,12 +31022,12 @@
   </p:clrMapOvr>
   <mc:AlternateContent xmlns:mc="http://schemas.openxmlformats.org/markup-compatibility/2006" xmlns:p159="http://schemas.microsoft.com/office/powerpoint/2015/09/main">
     <mc:Choice Requires="p159">
-      <p:transition xmlns:p14="http://schemas.microsoft.com/office/powerpoint/2010/main" spd="slow" p14:dur="2000">
+      <p:transition spd="med">
         <p159:morph option="byObject"/>
       </p:transition>
     </mc:Choice>
     <mc:Fallback xmlns="">
-      <p:transition spd="slow">
+      <p:transition spd="med">
         <p:fade/>
       </p:transition>
     </mc:Fallback>

</xml_diff>